<commit_message>
Regroup files for clarity. IQuestionHandler and IAnswerHandler for flexible contexts. Begin ChatContext for creating custom data contexts and queries.
</commit_message>
<xml_diff>
--- a/OpenAI/OpenAI_Playground_Specs.pptx
+++ b/OpenAI/OpenAI_Playground_Specs.pptx
@@ -402,7 +402,7 @@
           <a:p>
             <a:fld id="{FC5669F6-594E-4788-90F3-2EB446461493}" type="datetimeFigureOut">
               <a:rPr lang="nl-NL" smtClean="0"/>
-              <a:t>15-6-2023</a:t>
+              <a:t>8-7-2023</a:t>
             </a:fld>
             <a:endParaRPr lang="nl-NL"/>
           </a:p>
@@ -600,7 +600,7 @@
           <a:p>
             <a:fld id="{FC5669F6-594E-4788-90F3-2EB446461493}" type="datetimeFigureOut">
               <a:rPr lang="nl-NL" smtClean="0"/>
-              <a:t>15-6-2023</a:t>
+              <a:t>8-7-2023</a:t>
             </a:fld>
             <a:endParaRPr lang="nl-NL"/>
           </a:p>
@@ -808,7 +808,7 @@
           <a:p>
             <a:fld id="{FC5669F6-594E-4788-90F3-2EB446461493}" type="datetimeFigureOut">
               <a:rPr lang="nl-NL" smtClean="0"/>
-              <a:t>15-6-2023</a:t>
+              <a:t>8-7-2023</a:t>
             </a:fld>
             <a:endParaRPr lang="nl-NL"/>
           </a:p>
@@ -1006,7 +1006,7 @@
           <a:p>
             <a:fld id="{FC5669F6-594E-4788-90F3-2EB446461493}" type="datetimeFigureOut">
               <a:rPr lang="nl-NL" smtClean="0"/>
-              <a:t>15-6-2023</a:t>
+              <a:t>8-7-2023</a:t>
             </a:fld>
             <a:endParaRPr lang="nl-NL"/>
           </a:p>
@@ -1281,7 +1281,7 @@
           <a:p>
             <a:fld id="{FC5669F6-594E-4788-90F3-2EB446461493}" type="datetimeFigureOut">
               <a:rPr lang="nl-NL" smtClean="0"/>
-              <a:t>15-6-2023</a:t>
+              <a:t>8-7-2023</a:t>
             </a:fld>
             <a:endParaRPr lang="nl-NL"/>
           </a:p>
@@ -1546,7 +1546,7 @@
           <a:p>
             <a:fld id="{FC5669F6-594E-4788-90F3-2EB446461493}" type="datetimeFigureOut">
               <a:rPr lang="nl-NL" smtClean="0"/>
-              <a:t>15-6-2023</a:t>
+              <a:t>8-7-2023</a:t>
             </a:fld>
             <a:endParaRPr lang="nl-NL"/>
           </a:p>
@@ -1958,7 +1958,7 @@
           <a:p>
             <a:fld id="{FC5669F6-594E-4788-90F3-2EB446461493}" type="datetimeFigureOut">
               <a:rPr lang="nl-NL" smtClean="0"/>
-              <a:t>15-6-2023</a:t>
+              <a:t>8-7-2023</a:t>
             </a:fld>
             <a:endParaRPr lang="nl-NL"/>
           </a:p>
@@ -2099,7 +2099,7 @@
           <a:p>
             <a:fld id="{FC5669F6-594E-4788-90F3-2EB446461493}" type="datetimeFigureOut">
               <a:rPr lang="nl-NL" smtClean="0"/>
-              <a:t>15-6-2023</a:t>
+              <a:t>8-7-2023</a:t>
             </a:fld>
             <a:endParaRPr lang="nl-NL"/>
           </a:p>
@@ -2212,7 +2212,7 @@
           <a:p>
             <a:fld id="{FC5669F6-594E-4788-90F3-2EB446461493}" type="datetimeFigureOut">
               <a:rPr lang="nl-NL" smtClean="0"/>
-              <a:t>15-6-2023</a:t>
+              <a:t>8-7-2023</a:t>
             </a:fld>
             <a:endParaRPr lang="nl-NL"/>
           </a:p>
@@ -2523,7 +2523,7 @@
           <a:p>
             <a:fld id="{FC5669F6-594E-4788-90F3-2EB446461493}" type="datetimeFigureOut">
               <a:rPr lang="nl-NL" smtClean="0"/>
-              <a:t>15-6-2023</a:t>
+              <a:t>8-7-2023</a:t>
             </a:fld>
             <a:endParaRPr lang="nl-NL"/>
           </a:p>
@@ -2811,7 +2811,7 @@
           <a:p>
             <a:fld id="{FC5669F6-594E-4788-90F3-2EB446461493}" type="datetimeFigureOut">
               <a:rPr lang="nl-NL" smtClean="0"/>
-              <a:t>15-6-2023</a:t>
+              <a:t>8-7-2023</a:t>
             </a:fld>
             <a:endParaRPr lang="nl-NL"/>
           </a:p>
@@ -3052,7 +3052,7 @@
           <a:p>
             <a:fld id="{FC5669F6-594E-4788-90F3-2EB446461493}" type="datetimeFigureOut">
               <a:rPr lang="nl-NL" smtClean="0"/>
-              <a:t>15-6-2023</a:t>
+              <a:t>8-7-2023</a:t>
             </a:fld>
             <a:endParaRPr lang="nl-NL"/>
           </a:p>
@@ -3491,8 +3491,8 @@
         </p:nvSpPr>
         <p:spPr>
           <a:xfrm>
-            <a:off x="4465963" y="692705"/>
-            <a:ext cx="3260073" cy="1637745"/>
+            <a:off x="4465963" y="88963"/>
+            <a:ext cx="3260073" cy="2482787"/>
           </a:xfrm>
           <a:prstGeom prst="roundRect">
             <a:avLst>
@@ -3541,7 +3541,7 @@
                   <a:schemeClr val="tx1"/>
                 </a:solidFill>
               </a:rPr>
-              <a:t>TimeStampUTC</a:t>
+              <a:t>TimeStamp</a:t>
             </a:r>
             <a:r>
               <a:rPr lang="nl-NL" dirty="0">
@@ -3564,6 +3564,7 @@
                 <a:solidFill>
                   <a:srgbClr val="0070C0"/>
                 </a:solidFill>
+                <a:latin typeface="+mj-lt"/>
               </a:rPr>
               <a:t>datetime</a:t>
             </a:r>
@@ -3575,6 +3576,11 @@
               </a:rPr>
               <a:t>)</a:t>
             </a:r>
+            <a:endParaRPr lang="nl-NL" dirty="0">
+              <a:solidFill>
+                <a:schemeClr val="tx1"/>
+              </a:solidFill>
+            </a:endParaRPr>
           </a:p>
           <a:p>
             <a:pPr marL="285750" indent="-285750">
@@ -3582,12 +3588,20 @@
               <a:buChar char="•"/>
             </a:pPr>
             <a:r>
+              <a:rPr lang="nl-NL" dirty="0" err="1">
+                <a:solidFill>
+                  <a:schemeClr val="tx1"/>
+                </a:solidFill>
+              </a:rPr>
+              <a:t>TimeStampUTC</a:t>
+            </a:r>
+            <a:r>
               <a:rPr lang="nl-NL" dirty="0">
                 <a:solidFill>
                   <a:schemeClr val="tx1"/>
                 </a:solidFill>
               </a:rPr>
-              <a:t>Content </a:t>
+              <a:t> </a:t>
             </a:r>
             <a:r>
               <a:rPr lang="nl-NL" sz="1200" i="1" dirty="0">
@@ -3598,12 +3612,13 @@
               <a:t>(</a:t>
             </a:r>
             <a:r>
-              <a:rPr lang="nl-NL" sz="1200" i="1" dirty="0">
+              <a:rPr lang="nl-NL" sz="1200" i="1" dirty="0" err="1">
                 <a:solidFill>
                   <a:srgbClr val="0070C0"/>
                 </a:solidFill>
-              </a:rPr>
-              <a:t>string</a:t>
+                <a:latin typeface="+mj-lt"/>
+              </a:rPr>
+              <a:t>datetime</a:t>
             </a:r>
             <a:r>
               <a:rPr lang="nl-NL" sz="1200" i="1" dirty="0">
@@ -3625,7 +3640,7 @@
                   <a:schemeClr val="tx1"/>
                 </a:solidFill>
               </a:rPr>
-              <a:t>MessageType</a:t>
+              <a:t>ActualContent</a:t>
             </a:r>
             <a:r>
               <a:rPr lang="nl-NL" dirty="0">
@@ -3644,12 +3659,13 @@
               <a:t>(</a:t>
             </a:r>
             <a:r>
-              <a:rPr lang="nl-NL" sz="1200" i="1" dirty="0" err="1">
+              <a:rPr lang="nl-NL" sz="1200" i="1" dirty="0">
                 <a:solidFill>
                   <a:srgbClr val="0070C0"/>
                 </a:solidFill>
-              </a:rPr>
-              <a:t>enum</a:t>
+                <a:latin typeface="+mj-lt"/>
+              </a:rPr>
+              <a:t>string</a:t>
             </a:r>
             <a:r>
               <a:rPr lang="nl-NL" sz="1200" i="1" dirty="0">
@@ -3659,6 +3675,234 @@
               </a:rPr>
               <a:t>)</a:t>
             </a:r>
+          </a:p>
+          <a:p>
+            <a:pPr marL="285750" marR="0" lvl="0" indent="-285750" defTabSz="914400" rtl="0" eaLnBrk="1" fontAlgn="auto" latinLnBrk="0" hangingPunct="1">
+              <a:lnSpc>
+                <a:spcPct val="100000"/>
+              </a:lnSpc>
+              <a:spcBef>
+                <a:spcPts val="0"/>
+              </a:spcBef>
+              <a:spcAft>
+                <a:spcPts val="0"/>
+              </a:spcAft>
+              <a:buClrTx/>
+              <a:buSzTx/>
+              <a:buFont typeface="Arial" panose="020B0604020202020204" pitchFamily="34" charset="0"/>
+              <a:buChar char="•"/>
+              <a:tabLst/>
+              <a:defRPr/>
+            </a:pPr>
+            <a:r>
+              <a:rPr lang="nl-NL" dirty="0" err="1">
+                <a:solidFill>
+                  <a:schemeClr val="tx1"/>
+                </a:solidFill>
+              </a:rPr>
+              <a:t>DisplayedContent</a:t>
+            </a:r>
+            <a:r>
+              <a:rPr lang="nl-NL" dirty="0">
+                <a:solidFill>
+                  <a:schemeClr val="tx1"/>
+                </a:solidFill>
+              </a:rPr>
+              <a:t> </a:t>
+            </a:r>
+            <a:r>
+              <a:rPr kumimoji="0" lang="nl-NL" sz="1200" b="0" i="1" u="none" strike="noStrike" kern="1200" cap="none" spc="0" normalizeH="0" baseline="0" noProof="0" dirty="0">
+                <a:ln>
+                  <a:noFill/>
+                </a:ln>
+                <a:solidFill>
+                  <a:prstClr val="black"/>
+                </a:solidFill>
+                <a:effectLst/>
+                <a:uLnTx/>
+                <a:uFillTx/>
+                <a:latin typeface="Calibri" panose="020F0502020204030204"/>
+                <a:ea typeface="+mn-ea"/>
+                <a:cs typeface="+mn-cs"/>
+              </a:rPr>
+              <a:t>(</a:t>
+            </a:r>
+            <a:r>
+              <a:rPr kumimoji="0" lang="nl-NL" sz="1200" i="1" u="none" strike="noStrike" kern="1200" cap="none" spc="0" normalizeH="0" baseline="0" noProof="0" dirty="0">
+                <a:ln>
+                  <a:noFill/>
+                </a:ln>
+                <a:solidFill>
+                  <a:srgbClr val="0070C0"/>
+                </a:solidFill>
+                <a:effectLst/>
+                <a:uLnTx/>
+                <a:uFillTx/>
+                <a:latin typeface="+mj-lt"/>
+                <a:ea typeface="+mn-ea"/>
+                <a:cs typeface="+mn-cs"/>
+              </a:rPr>
+              <a:t>string</a:t>
+            </a:r>
+            <a:r>
+              <a:rPr kumimoji="0" lang="nl-NL" sz="1200" b="0" i="1" u="none" strike="noStrike" kern="1200" cap="none" spc="0" normalizeH="0" baseline="0" noProof="0" dirty="0">
+                <a:ln>
+                  <a:noFill/>
+                </a:ln>
+                <a:solidFill>
+                  <a:prstClr val="black"/>
+                </a:solidFill>
+                <a:effectLst/>
+                <a:uLnTx/>
+                <a:uFillTx/>
+                <a:latin typeface="Calibri" panose="020F0502020204030204"/>
+                <a:ea typeface="+mn-ea"/>
+                <a:cs typeface="+mn-cs"/>
+              </a:rPr>
+              <a:t>)</a:t>
+            </a:r>
+          </a:p>
+          <a:p>
+            <a:pPr marL="285750" marR="0" lvl="0" indent="-285750" defTabSz="914400" rtl="0" eaLnBrk="1" fontAlgn="auto" latinLnBrk="0" hangingPunct="1">
+              <a:lnSpc>
+                <a:spcPct val="100000"/>
+              </a:lnSpc>
+              <a:spcBef>
+                <a:spcPts val="0"/>
+              </a:spcBef>
+              <a:spcAft>
+                <a:spcPts val="0"/>
+              </a:spcAft>
+              <a:buClrTx/>
+              <a:buSzTx/>
+              <a:buFont typeface="Arial" panose="020B0604020202020204" pitchFamily="34" charset="0"/>
+              <a:buChar char="•"/>
+              <a:tabLst/>
+              <a:defRPr/>
+            </a:pPr>
+            <a:r>
+              <a:rPr lang="nl-NL" dirty="0" err="1">
+                <a:solidFill>
+                  <a:schemeClr val="tx1"/>
+                </a:solidFill>
+              </a:rPr>
+              <a:t>Sentences</a:t>
+            </a:r>
+            <a:r>
+              <a:rPr lang="nl-NL" dirty="0">
+                <a:solidFill>
+                  <a:schemeClr val="tx1"/>
+                </a:solidFill>
+              </a:rPr>
+              <a:t> </a:t>
+            </a:r>
+            <a:r>
+              <a:rPr kumimoji="0" lang="nl-NL" sz="1200" b="0" i="1" u="none" strike="noStrike" kern="1200" cap="none" spc="0" normalizeH="0" baseline="0" noProof="0" dirty="0">
+                <a:ln>
+                  <a:noFill/>
+                </a:ln>
+                <a:solidFill>
+                  <a:prstClr val="black"/>
+                </a:solidFill>
+                <a:effectLst/>
+                <a:uLnTx/>
+                <a:uFillTx/>
+                <a:latin typeface="Calibri" panose="020F0502020204030204"/>
+                <a:ea typeface="+mn-ea"/>
+                <a:cs typeface="+mn-cs"/>
+              </a:rPr>
+              <a:t>(</a:t>
+            </a:r>
+            <a:r>
+              <a:rPr kumimoji="0" lang="nl-NL" sz="1200" i="1" u="none" strike="noStrike" kern="1200" cap="none" spc="0" normalizeH="0" baseline="0" noProof="0" dirty="0">
+                <a:ln>
+                  <a:noFill/>
+                </a:ln>
+                <a:solidFill>
+                  <a:srgbClr val="0070C0"/>
+                </a:solidFill>
+                <a:effectLst/>
+                <a:uLnTx/>
+                <a:uFillTx/>
+                <a:latin typeface="+mj-lt"/>
+                <a:ea typeface="+mn-ea"/>
+                <a:cs typeface="+mn-cs"/>
+              </a:rPr>
+              <a:t>List</a:t>
+            </a:r>
+            <a:r>
+              <a:rPr kumimoji="0" lang="nl-NL" sz="1200" b="0" i="1" u="none" strike="noStrike" kern="1200" cap="none" spc="0" normalizeH="0" baseline="0" noProof="0" dirty="0">
+                <a:ln>
+                  <a:noFill/>
+                </a:ln>
+                <a:solidFill>
+                  <a:prstClr val="black"/>
+                </a:solidFill>
+                <a:effectLst/>
+                <a:uLnTx/>
+                <a:uFillTx/>
+                <a:latin typeface="Calibri" panose="020F0502020204030204"/>
+                <a:ea typeface="+mn-ea"/>
+                <a:cs typeface="+mn-cs"/>
+              </a:rPr>
+              <a:t>&lt;</a:t>
+            </a:r>
+            <a:r>
+              <a:rPr kumimoji="0" lang="nl-NL" sz="1200" i="1" u="none" strike="noStrike" kern="1200" cap="none" spc="0" normalizeH="0" baseline="0" noProof="0" dirty="0">
+                <a:ln>
+                  <a:noFill/>
+                </a:ln>
+                <a:solidFill>
+                  <a:srgbClr val="0070C0"/>
+                </a:solidFill>
+                <a:effectLst/>
+                <a:uLnTx/>
+                <a:uFillTx/>
+                <a:latin typeface="+mj-lt"/>
+                <a:ea typeface="+mn-ea"/>
+                <a:cs typeface="+mn-cs"/>
+              </a:rPr>
+              <a:t>string</a:t>
+            </a:r>
+            <a:r>
+              <a:rPr kumimoji="0" lang="nl-NL" sz="1200" b="0" i="1" u="none" strike="noStrike" kern="1200" cap="none" spc="0" normalizeH="0" baseline="0" noProof="0" dirty="0">
+                <a:ln>
+                  <a:noFill/>
+                </a:ln>
+                <a:solidFill>
+                  <a:srgbClr val="0070C0"/>
+                </a:solidFill>
+                <a:effectLst/>
+                <a:uLnTx/>
+                <a:uFillTx/>
+                <a:latin typeface="Calibri" panose="020F0502020204030204"/>
+                <a:ea typeface="+mn-ea"/>
+                <a:cs typeface="+mn-cs"/>
+              </a:rPr>
+              <a:t>&gt;</a:t>
+            </a:r>
+            <a:r>
+              <a:rPr kumimoji="0" lang="nl-NL" sz="1200" b="0" i="1" u="none" strike="noStrike" kern="1200" cap="none" spc="0" normalizeH="0" baseline="0" noProof="0" dirty="0">
+                <a:ln>
+                  <a:noFill/>
+                </a:ln>
+                <a:solidFill>
+                  <a:prstClr val="black"/>
+                </a:solidFill>
+                <a:effectLst/>
+                <a:uLnTx/>
+                <a:uFillTx/>
+                <a:latin typeface="Calibri" panose="020F0502020204030204"/>
+                <a:ea typeface="+mn-ea"/>
+                <a:cs typeface="+mn-cs"/>
+              </a:rPr>
+              <a:t>)</a:t>
+            </a:r>
+            <a:endParaRPr lang="nl-NL" dirty="0">
+              <a:solidFill>
+                <a:schemeClr val="tx1"/>
+              </a:solidFill>
+            </a:endParaRPr>
           </a:p>
           <a:p>
             <a:pPr marL="285750" indent="-285750">
@@ -3671,6 +3915,53 @@
                   <a:schemeClr val="tx1"/>
                 </a:solidFill>
               </a:rPr>
+              <a:t>MessageType</a:t>
+            </a:r>
+            <a:r>
+              <a:rPr lang="nl-NL" dirty="0">
+                <a:solidFill>
+                  <a:schemeClr val="tx1"/>
+                </a:solidFill>
+              </a:rPr>
+              <a:t> </a:t>
+            </a:r>
+            <a:r>
+              <a:rPr lang="nl-NL" sz="1200" i="1" dirty="0">
+                <a:solidFill>
+                  <a:schemeClr val="tx1"/>
+                </a:solidFill>
+              </a:rPr>
+              <a:t>(</a:t>
+            </a:r>
+            <a:r>
+              <a:rPr lang="nl-NL" sz="1200" i="1" dirty="0" err="1">
+                <a:solidFill>
+                  <a:srgbClr val="0070C0"/>
+                </a:solidFill>
+                <a:latin typeface="+mj-lt"/>
+              </a:rPr>
+              <a:t>enum</a:t>
+            </a:r>
+            <a:r>
+              <a:rPr lang="nl-NL" sz="1200" i="1" dirty="0">
+                <a:solidFill>
+                  <a:schemeClr val="tx1"/>
+                </a:solidFill>
+              </a:rPr>
+              <a:t>)</a:t>
+            </a:r>
+          </a:p>
+          <a:p>
+            <a:pPr marL="285750" indent="-285750">
+              <a:buFont typeface="Arial" panose="020B0604020202020204" pitchFamily="34" charset="0"/>
+              <a:buChar char="•"/>
+            </a:pPr>
+            <a:r>
+              <a:rPr lang="nl-NL" dirty="0" err="1">
+                <a:solidFill>
+                  <a:schemeClr val="tx1"/>
+                </a:solidFill>
+              </a:rPr>
               <a:t>IsSpoken</a:t>
             </a:r>
             <a:r>
@@ -3690,10 +3981,11 @@
               <a:t>(</a:t>
             </a:r>
             <a:r>
-              <a:rPr lang="nl-NL" sz="1000" i="1" dirty="0" err="1">
+              <a:rPr lang="nl-NL" sz="1200" i="1" dirty="0" err="1">
                 <a:solidFill>
                   <a:srgbClr val="0070C0"/>
                 </a:solidFill>
+                <a:latin typeface="+mj-lt"/>
               </a:rPr>
               <a:t>bool</a:t>
             </a:r>
@@ -3791,7 +4083,7 @@
         </p:nvSpPr>
         <p:spPr>
           <a:xfrm>
-            <a:off x="4465963" y="692528"/>
+            <a:off x="4465963" y="88786"/>
             <a:ext cx="3260073" cy="375910"/>
           </a:xfrm>
           <a:prstGeom prst="round2SameRect">
@@ -3856,8 +4148,8 @@
         </p:nvSpPr>
         <p:spPr>
           <a:xfrm>
-            <a:off x="4089400" y="3188066"/>
-            <a:ext cx="4019549" cy="1091834"/>
+            <a:off x="4086225" y="3053266"/>
+            <a:ext cx="4019549" cy="1625537"/>
           </a:xfrm>
           <a:prstGeom prst="roundRect">
             <a:avLst>
@@ -3929,6 +4221,7 @@
                 <a:solidFill>
                   <a:srgbClr val="0070C0"/>
                 </a:solidFill>
+                <a:latin typeface="+mj-lt"/>
               </a:rPr>
               <a:t>ObservableCollection</a:t>
             </a:r>
@@ -3945,6 +4238,7 @@
                 <a:solidFill>
                   <a:srgbClr val="0070C0"/>
                 </a:solidFill>
+                <a:latin typeface="+mj-lt"/>
               </a:rPr>
               <a:t>ChatMessage</a:t>
             </a:r>
@@ -3973,6 +4267,97 @@
                   <a:schemeClr val="tx1"/>
                 </a:solidFill>
               </a:rPr>
+              <a:t>Title</a:t>
+            </a:r>
+            <a:r>
+              <a:rPr lang="nl-NL" dirty="0">
+                <a:solidFill>
+                  <a:schemeClr val="tx1"/>
+                </a:solidFill>
+              </a:rPr>
+              <a:t> </a:t>
+            </a:r>
+            <a:r>
+              <a:rPr lang="nl-NL" sz="800" i="1" dirty="0">
+                <a:solidFill>
+                  <a:schemeClr val="tx1"/>
+                </a:solidFill>
+              </a:rPr>
+              <a:t>(</a:t>
+            </a:r>
+            <a:r>
+              <a:rPr lang="nl-NL" sz="1200" i="1" dirty="0">
+                <a:solidFill>
+                  <a:srgbClr val="0070C0"/>
+                </a:solidFill>
+                <a:latin typeface="+mj-lt"/>
+              </a:rPr>
+              <a:t>string</a:t>
+            </a:r>
+            <a:r>
+              <a:rPr lang="nl-NL" sz="800" i="1" dirty="0">
+                <a:solidFill>
+                  <a:schemeClr val="tx1"/>
+                </a:solidFill>
+              </a:rPr>
+              <a:t>)</a:t>
+            </a:r>
+          </a:p>
+          <a:p>
+            <a:pPr marL="285750" indent="-285750">
+              <a:buFont typeface="Arial" panose="020B0604020202020204" pitchFamily="34" charset="0"/>
+              <a:buChar char="•"/>
+            </a:pPr>
+            <a:r>
+              <a:rPr lang="nl-NL" dirty="0">
+                <a:solidFill>
+                  <a:schemeClr val="tx1"/>
+                </a:solidFill>
+              </a:rPr>
+              <a:t>Context </a:t>
+            </a:r>
+            <a:r>
+              <a:rPr lang="nl-NL" sz="800" i="1" dirty="0">
+                <a:solidFill>
+                  <a:schemeClr val="tx1"/>
+                </a:solidFill>
+              </a:rPr>
+              <a:t>(</a:t>
+            </a:r>
+            <a:r>
+              <a:rPr lang="nl-NL" sz="1200" i="1" dirty="0" err="1">
+                <a:solidFill>
+                  <a:srgbClr val="0070C0"/>
+                </a:solidFill>
+                <a:latin typeface="+mj-lt"/>
+              </a:rPr>
+              <a:t>ChatContext</a:t>
+            </a:r>
+            <a:r>
+              <a:rPr lang="nl-NL" sz="800" i="1" dirty="0">
+                <a:solidFill>
+                  <a:schemeClr val="tx1"/>
+                </a:solidFill>
+              </a:rPr>
+              <a:t>)</a:t>
+            </a:r>
+            <a:endParaRPr lang="nl-NL" dirty="0">
+              <a:solidFill>
+                <a:schemeClr val="tx1"/>
+              </a:solidFill>
+            </a:endParaRPr>
+          </a:p>
+          <a:p>
+            <a:pPr marL="285750" indent="-285750">
+              <a:buFont typeface="Arial" panose="020B0604020202020204" pitchFamily="34" charset="0"/>
+              <a:buChar char="•"/>
+            </a:pPr>
+            <a:r>
+              <a:rPr lang="nl-NL" dirty="0" err="1">
+                <a:solidFill>
+                  <a:schemeClr val="tx1"/>
+                </a:solidFill>
+              </a:rPr>
               <a:t>IsActive</a:t>
             </a:r>
             <a:r>
@@ -3992,10 +4377,11 @@
               <a:t>(</a:t>
             </a:r>
             <a:r>
-              <a:rPr lang="nl-NL" sz="800" i="1" dirty="0" err="1">
+              <a:rPr lang="nl-NL" sz="1200" i="1" dirty="0" err="1">
                 <a:solidFill>
                   <a:srgbClr val="0070C0"/>
                 </a:solidFill>
+                <a:latin typeface="+mj-lt"/>
               </a:rPr>
               <a:t>bool</a:t>
             </a:r>
@@ -4035,7 +4421,7 @@
         </p:nvSpPr>
         <p:spPr>
           <a:xfrm>
-            <a:off x="4089400" y="3187889"/>
+            <a:off x="4086225" y="3053090"/>
             <a:ext cx="4019549" cy="375910"/>
           </a:xfrm>
           <a:prstGeom prst="round2SameRect">
@@ -4099,8 +4485,8 @@
         </p:nvSpPr>
         <p:spPr>
           <a:xfrm>
-            <a:off x="4413251" y="4985305"/>
-            <a:ext cx="3359149" cy="1148795"/>
+            <a:off x="4011613" y="5137918"/>
+            <a:ext cx="4156075" cy="1631950"/>
           </a:xfrm>
           <a:prstGeom prst="roundRect">
             <a:avLst>
@@ -4144,45 +4530,478 @@
               <a:buChar char="•"/>
             </a:pPr>
             <a:r>
+              <a:rPr lang="nl-NL" sz="1200" dirty="0">
+                <a:solidFill>
+                  <a:schemeClr val="tx1"/>
+                </a:solidFill>
+                <a:latin typeface="+mj-lt"/>
+              </a:rPr>
+              <a:t>: </a:t>
+            </a:r>
+            <a:r>
+              <a:rPr lang="nl-NL" sz="1200" dirty="0" err="1">
+                <a:solidFill>
+                  <a:srgbClr val="0070C0"/>
+                </a:solidFill>
+                <a:latin typeface="+mj-lt"/>
+              </a:rPr>
+              <a:t>ObservableCollection</a:t>
+            </a:r>
+            <a:r>
+              <a:rPr lang="nl-NL" sz="1200" dirty="0">
+                <a:solidFill>
+                  <a:schemeClr val="tx1"/>
+                </a:solidFill>
+                <a:latin typeface="+mj-lt"/>
+              </a:rPr>
+              <a:t>&lt;</a:t>
+            </a:r>
+            <a:r>
+              <a:rPr lang="nl-NL" sz="1200" dirty="0">
+                <a:solidFill>
+                  <a:srgbClr val="0070C0"/>
+                </a:solidFill>
+                <a:latin typeface="+mj-lt"/>
+              </a:rPr>
+              <a:t>Chat</a:t>
+            </a:r>
+            <a:r>
+              <a:rPr lang="nl-NL" sz="1200" dirty="0">
+                <a:solidFill>
+                  <a:schemeClr val="tx1"/>
+                </a:solidFill>
+                <a:latin typeface="+mj-lt"/>
+              </a:rPr>
+              <a:t>&gt;</a:t>
+            </a:r>
+          </a:p>
+          <a:p>
+            <a:pPr marL="285750" indent="-285750">
+              <a:buFont typeface="Arial" panose="020B0604020202020204" pitchFamily="34" charset="0"/>
+              <a:buChar char="•"/>
+            </a:pPr>
+            <a:r>
+              <a:rPr lang="nl-NL" sz="1600" i="1" dirty="0">
+                <a:solidFill>
+                  <a:schemeClr val="tx1"/>
+                </a:solidFill>
+              </a:rPr>
+              <a:t> </a:t>
+            </a:r>
+            <a:r>
+              <a:rPr lang="nl-NL" sz="1200" i="1" dirty="0" err="1">
+                <a:solidFill>
+                  <a:srgbClr val="0070C0"/>
+                </a:solidFill>
+                <a:latin typeface="+mj-lt"/>
+              </a:rPr>
+              <a:t>ChatCollection</a:t>
+            </a:r>
+            <a:r>
               <a:rPr lang="nl-NL" dirty="0">
                 <a:solidFill>
                   <a:schemeClr val="tx1"/>
                 </a:solidFill>
               </a:rPr>
-              <a:t>: </a:t>
+              <a:t> </a:t>
             </a:r>
             <a:r>
               <a:rPr lang="nl-NL" dirty="0" err="1">
                 <a:solidFill>
+                  <a:schemeClr val="tx1"/>
+                </a:solidFill>
+              </a:rPr>
+              <a:t>FromJson</a:t>
+            </a:r>
+            <a:r>
+              <a:rPr lang="nl-NL" sz="1800" i="1" dirty="0">
+                <a:solidFill>
+                  <a:schemeClr val="tx1"/>
+                </a:solidFill>
+              </a:rPr>
+              <a:t>(</a:t>
+            </a:r>
+            <a:r>
+              <a:rPr lang="nl-NL" sz="1200" i="1" dirty="0">
+                <a:solidFill>
                   <a:srgbClr val="0070C0"/>
                 </a:solidFill>
-              </a:rPr>
-              <a:t>ObservableCollection</a:t>
-            </a:r>
+                <a:latin typeface="+mj-lt"/>
+              </a:rPr>
+              <a:t>string</a:t>
+            </a:r>
+            <a:r>
+              <a:rPr lang="nl-NL" sz="1800" i="1" dirty="0">
+                <a:solidFill>
+                  <a:srgbClr val="0070C0"/>
+                </a:solidFill>
+              </a:rPr>
+              <a:t> </a:t>
+            </a:r>
+            <a:r>
+              <a:rPr lang="nl-NL" sz="1800" dirty="0" err="1">
+                <a:solidFill>
+                  <a:schemeClr val="tx1"/>
+                </a:solidFill>
+              </a:rPr>
+              <a:t>json</a:t>
+            </a:r>
+            <a:r>
+              <a:rPr lang="nl-NL" sz="1800" i="1" dirty="0">
+                <a:solidFill>
+                  <a:schemeClr val="tx1"/>
+                </a:solidFill>
+              </a:rPr>
+              <a:t>)</a:t>
+            </a:r>
+          </a:p>
+          <a:p>
+            <a:pPr marL="285750" indent="-285750">
+              <a:buFont typeface="Arial" panose="020B0604020202020204" pitchFamily="34" charset="0"/>
+              <a:buChar char="•"/>
+            </a:pPr>
+            <a:r>
+              <a:rPr lang="nl-NL" i="1" dirty="0">
+                <a:solidFill>
+                  <a:schemeClr val="tx1"/>
+                </a:solidFill>
+              </a:rPr>
+              <a:t> </a:t>
+            </a:r>
+            <a:r>
+              <a:rPr lang="nl-NL" sz="1200" i="1" dirty="0">
+                <a:solidFill>
+                  <a:srgbClr val="0070C0"/>
+                </a:solidFill>
+                <a:latin typeface="+mj-lt"/>
+              </a:rPr>
+              <a:t>string</a:t>
+            </a:r>
+            <a:r>
+              <a:rPr lang="nl-NL" sz="1800" i="1" dirty="0">
+                <a:solidFill>
+                  <a:srgbClr val="0070C0"/>
+                </a:solidFill>
+              </a:rPr>
+              <a:t> </a:t>
+            </a:r>
+            <a:r>
+              <a:rPr lang="nl-NL" sz="1800" dirty="0" err="1">
+                <a:solidFill>
+                  <a:schemeClr val="tx1"/>
+                </a:solidFill>
+              </a:rPr>
+              <a:t>ToJson</a:t>
+            </a:r>
+            <a:r>
+              <a:rPr lang="nl-NL" sz="1800" dirty="0">
+                <a:solidFill>
+                  <a:schemeClr val="tx1"/>
+                </a:solidFill>
+              </a:rPr>
+              <a:t>()</a:t>
+            </a:r>
+          </a:p>
+          <a:p>
+            <a:pPr marL="285750" indent="-285750">
+              <a:buFont typeface="Arial" panose="020B0604020202020204" pitchFamily="34" charset="0"/>
+              <a:buChar char="•"/>
+            </a:pPr>
+            <a:endParaRPr lang="nl-NL" dirty="0">
+              <a:solidFill>
+                <a:schemeClr val="tx1"/>
+              </a:solidFill>
+            </a:endParaRPr>
+          </a:p>
+        </p:txBody>
+      </p:sp>
+      <p:sp>
+        <p:nvSpPr>
+          <p:cNvPr id="18" name="Rechthoek: afgeronde bovenhoeken 17">
+            <a:extLst>
+              <a:ext uri="{FF2B5EF4-FFF2-40B4-BE49-F238E27FC236}">
+                <a16:creationId xmlns:a16="http://schemas.microsoft.com/office/drawing/2014/main" id="{84C11868-D824-2EF2-BEDB-8898C8F27253}"/>
+              </a:ext>
+            </a:extLst>
+          </p:cNvPr>
+          <p:cNvSpPr/>
+          <p:nvPr/>
+        </p:nvSpPr>
+        <p:spPr>
+          <a:xfrm>
+            <a:off x="4017962" y="5137918"/>
+            <a:ext cx="4156075" cy="375910"/>
+          </a:xfrm>
+          <a:prstGeom prst="round2SameRect">
+            <a:avLst>
+              <a:gd name="adj1" fmla="val 38175"/>
+              <a:gd name="adj2" fmla="val 0"/>
+            </a:avLst>
+          </a:prstGeom>
+          <a:solidFill>
+            <a:schemeClr val="accent1"/>
+          </a:solidFill>
+          <a:ln w="31750">
+            <a:solidFill>
+              <a:schemeClr val="accent6">
+                <a:lumMod val="40000"/>
+                <a:lumOff val="60000"/>
+              </a:schemeClr>
+            </a:solidFill>
+          </a:ln>
+          <a:effectLst/>
+        </p:spPr>
+        <p:style>
+          <a:lnRef idx="2">
+            <a:schemeClr val="accent1">
+              <a:shade val="50000"/>
+            </a:schemeClr>
+          </a:lnRef>
+          <a:fillRef idx="1">
+            <a:schemeClr val="accent1"/>
+          </a:fillRef>
+          <a:effectRef idx="0">
+            <a:schemeClr val="accent1"/>
+          </a:effectRef>
+          <a:fontRef idx="minor">
+            <a:schemeClr val="lt1"/>
+          </a:fontRef>
+        </p:style>
+        <p:txBody>
+          <a:bodyPr rtlCol="0" anchor="ctr"/>
+          <a:lstStyle/>
+          <a:p>
+            <a:pPr algn="ctr"/>
+            <a:r>
+              <a:rPr lang="nl-NL" dirty="0" err="1"/>
+              <a:t>ChatCollection</a:t>
+            </a:r>
+            <a:endParaRPr lang="nl-NL" dirty="0"/>
+          </a:p>
+        </p:txBody>
+      </p:sp>
+      <p:cxnSp>
+        <p:nvCxnSpPr>
+          <p:cNvPr id="20" name="Rechte verbindingslijn met pijl 19">
+            <a:extLst>
+              <a:ext uri="{FF2B5EF4-FFF2-40B4-BE49-F238E27FC236}">
+                <a16:creationId xmlns:a16="http://schemas.microsoft.com/office/drawing/2014/main" id="{DA8D83B7-C676-3A51-43A8-1871573A5C6B}"/>
+              </a:ext>
+            </a:extLst>
+          </p:cNvPr>
+          <p:cNvCxnSpPr>
+            <a:cxnSpLocks/>
+            <a:stCxn id="3" idx="2"/>
+            <a:endCxn id="18" idx="3"/>
+          </p:cNvCxnSpPr>
+          <p:nvPr/>
+        </p:nvCxnSpPr>
+        <p:spPr>
+          <a:xfrm>
+            <a:off x="6096000" y="4678803"/>
+            <a:ext cx="0" cy="459115"/>
+          </a:xfrm>
+          <a:prstGeom prst="straightConnector1">
+            <a:avLst/>
+          </a:prstGeom>
+          <a:ln w="38100">
+            <a:tailEnd type="triangle"/>
+          </a:ln>
+        </p:spPr>
+        <p:style>
+          <a:lnRef idx="1">
+            <a:schemeClr val="accent1"/>
+          </a:lnRef>
+          <a:fillRef idx="0">
+            <a:schemeClr val="accent1"/>
+          </a:fillRef>
+          <a:effectRef idx="0">
+            <a:schemeClr val="accent1"/>
+          </a:effectRef>
+          <a:fontRef idx="minor">
+            <a:schemeClr val="tx1"/>
+          </a:fontRef>
+        </p:style>
+      </p:cxnSp>
+      <p:cxnSp>
+        <p:nvCxnSpPr>
+          <p:cNvPr id="21" name="Rechte verbindingslijn met pijl 20">
+            <a:extLst>
+              <a:ext uri="{FF2B5EF4-FFF2-40B4-BE49-F238E27FC236}">
+                <a16:creationId xmlns:a16="http://schemas.microsoft.com/office/drawing/2014/main" id="{43BCA1FF-821F-8FFA-9B71-96B8597B0974}"/>
+              </a:ext>
+            </a:extLst>
+          </p:cNvPr>
+          <p:cNvCxnSpPr>
+            <a:cxnSpLocks/>
+            <a:stCxn id="14" idx="2"/>
+            <a:endCxn id="6" idx="3"/>
+          </p:cNvCxnSpPr>
+          <p:nvPr/>
+        </p:nvCxnSpPr>
+        <p:spPr>
+          <a:xfrm>
+            <a:off x="6096000" y="2571750"/>
+            <a:ext cx="0" cy="481340"/>
+          </a:xfrm>
+          <a:prstGeom prst="straightConnector1">
+            <a:avLst/>
+          </a:prstGeom>
+          <a:ln w="38100">
+            <a:tailEnd type="triangle"/>
+          </a:ln>
+        </p:spPr>
+        <p:style>
+          <a:lnRef idx="1">
+            <a:schemeClr val="accent1"/>
+          </a:lnRef>
+          <a:fillRef idx="0">
+            <a:schemeClr val="accent1"/>
+          </a:fillRef>
+          <a:effectRef idx="0">
+            <a:schemeClr val="accent1"/>
+          </a:effectRef>
+          <a:fontRef idx="minor">
+            <a:schemeClr val="tx1"/>
+          </a:fontRef>
+        </p:style>
+      </p:cxnSp>
+      <p:sp>
+        <p:nvSpPr>
+          <p:cNvPr id="8" name="Rechthoek: afgeronde hoeken 7">
+            <a:extLst>
+              <a:ext uri="{FF2B5EF4-FFF2-40B4-BE49-F238E27FC236}">
+                <a16:creationId xmlns:a16="http://schemas.microsoft.com/office/drawing/2014/main" id="{D50B67BA-81D6-1E20-CC0B-F5A6D20DC026}"/>
+              </a:ext>
+            </a:extLst>
+          </p:cNvPr>
+          <p:cNvSpPr/>
+          <p:nvPr/>
+        </p:nvSpPr>
+        <p:spPr>
+          <a:xfrm>
+            <a:off x="88900" y="3035413"/>
+            <a:ext cx="3359149" cy="1643390"/>
+          </a:xfrm>
+          <a:prstGeom prst="roundRect">
+            <a:avLst>
+              <a:gd name="adj" fmla="val 10943"/>
+            </a:avLst>
+          </a:prstGeom>
+          <a:solidFill>
+            <a:schemeClr val="bg1"/>
+          </a:solidFill>
+          <a:ln w="31750">
+            <a:solidFill>
+              <a:schemeClr val="accent6">
+                <a:lumMod val="40000"/>
+                <a:lumOff val="60000"/>
+              </a:schemeClr>
+            </a:solidFill>
+          </a:ln>
+        </p:spPr>
+        <p:style>
+          <a:lnRef idx="2">
+            <a:schemeClr val="accent1">
+              <a:shade val="50000"/>
+            </a:schemeClr>
+          </a:lnRef>
+          <a:fillRef idx="1">
+            <a:schemeClr val="accent1"/>
+          </a:fillRef>
+          <a:effectRef idx="0">
+            <a:schemeClr val="accent1"/>
+          </a:effectRef>
+          <a:fontRef idx="minor">
+            <a:schemeClr val="lt1"/>
+          </a:fontRef>
+        </p:style>
+        <p:txBody>
+          <a:bodyPr tIns="360000" rtlCol="0" anchor="t" anchorCtr="0"/>
+          <a:lstStyle/>
+          <a:p>
+            <a:pPr marL="285750" indent="-285750">
+              <a:buFont typeface="Arial" panose="020B0604020202020204" pitchFamily="34" charset="0"/>
+              <a:buChar char="•"/>
+            </a:pPr>
             <a:r>
               <a:rPr lang="nl-NL" dirty="0">
                 <a:solidFill>
                   <a:schemeClr val="tx1"/>
                 </a:solidFill>
               </a:rPr>
-              <a:t>&lt;</a:t>
-            </a:r>
+              <a:t>Name </a:t>
+            </a:r>
+            <a:r>
+              <a:rPr lang="nl-NL" sz="1200" i="1" dirty="0">
+                <a:solidFill>
+                  <a:schemeClr val="tx1"/>
+                </a:solidFill>
+              </a:rPr>
+              <a:t>(</a:t>
+            </a:r>
+            <a:r>
+              <a:rPr lang="nl-NL" sz="1200" i="1" dirty="0">
+                <a:solidFill>
+                  <a:srgbClr val="0070C0"/>
+                </a:solidFill>
+                <a:latin typeface="+mj-lt"/>
+              </a:rPr>
+              <a:t>string</a:t>
+            </a:r>
+            <a:r>
+              <a:rPr lang="nl-NL" sz="1200" i="1" dirty="0">
+                <a:solidFill>
+                  <a:schemeClr val="tx1"/>
+                </a:solidFill>
+              </a:rPr>
+              <a:t>)</a:t>
+            </a:r>
+          </a:p>
+          <a:p>
+            <a:pPr marL="285750" indent="-285750">
+              <a:buFont typeface="Arial" panose="020B0604020202020204" pitchFamily="34" charset="0"/>
+              <a:buChar char="•"/>
+            </a:pPr>
             <a:r>
               <a:rPr lang="nl-NL" dirty="0">
                 <a:solidFill>
+                  <a:schemeClr val="tx1"/>
+                </a:solidFill>
+              </a:rPr>
+              <a:t>Context </a:t>
+            </a:r>
+            <a:r>
+              <a:rPr lang="nl-NL" sz="1200" i="1" dirty="0">
+                <a:solidFill>
+                  <a:schemeClr val="tx1"/>
+                </a:solidFill>
+              </a:rPr>
+              <a:t>(</a:t>
+            </a:r>
+            <a:r>
+              <a:rPr lang="nl-NL" sz="1200" i="1" dirty="0">
+                <a:solidFill>
                   <a:srgbClr val="0070C0"/>
                 </a:solidFill>
-              </a:rPr>
-              <a:t>Chat</a:t>
-            </a:r>
-            <a:r>
-              <a:rPr lang="nl-NL" dirty="0">
-                <a:solidFill>
-                  <a:schemeClr val="tx1"/>
-                </a:solidFill>
-              </a:rPr>
-              <a:t>&gt;</a:t>
-            </a:r>
+                <a:latin typeface="+mj-lt"/>
+              </a:rPr>
+              <a:t>string</a:t>
+            </a:r>
+            <a:r>
+              <a:rPr lang="nl-NL" sz="1200" i="1" dirty="0">
+                <a:solidFill>
+                  <a:schemeClr val="tx1"/>
+                </a:solidFill>
+              </a:rPr>
+              <a:t>)</a:t>
+            </a:r>
+          </a:p>
+          <a:p>
+            <a:pPr marL="285750" indent="-285750">
+              <a:buFont typeface="Arial" panose="020B0604020202020204" pitchFamily="34" charset="0"/>
+              <a:buChar char="•"/>
+            </a:pPr>
             <a:endParaRPr lang="nl-NL" sz="1200" i="1" dirty="0">
               <a:solidFill>
                 <a:schemeClr val="tx1"/>
@@ -4193,10 +5012,10 @@
       </p:sp>
       <p:sp>
         <p:nvSpPr>
-          <p:cNvPr id="18" name="Rechthoek: afgeronde bovenhoeken 17">
-            <a:extLst>
-              <a:ext uri="{FF2B5EF4-FFF2-40B4-BE49-F238E27FC236}">
-                <a16:creationId xmlns:a16="http://schemas.microsoft.com/office/drawing/2014/main" id="{84C11868-D824-2EF2-BEDB-8898C8F27253}"/>
+          <p:cNvPr id="9" name="Rechthoek: afgeronde bovenhoeken 8">
+            <a:extLst>
+              <a:ext uri="{FF2B5EF4-FFF2-40B4-BE49-F238E27FC236}">
+                <a16:creationId xmlns:a16="http://schemas.microsoft.com/office/drawing/2014/main" id="{ECD651F0-B4B7-44E1-244F-66140E0E88B8}"/>
               </a:ext>
             </a:extLst>
           </p:cNvPr>
@@ -4205,7 +5024,7 @@
         </p:nvSpPr>
         <p:spPr>
           <a:xfrm>
-            <a:off x="4413251" y="4985128"/>
+            <a:off x="95249" y="3035413"/>
             <a:ext cx="3359149" cy="375910"/>
           </a:xfrm>
           <a:prstGeom prst="round2SameRect">
@@ -4250,7 +5069,7 @@
             <a:pPr algn="ctr"/>
             <a:r>
               <a:rPr lang="nl-NL" dirty="0" err="1"/>
-              <a:t>ChatCollection</a:t>
+              <a:t>ChatContext</a:t>
             </a:r>
             <a:endParaRPr lang="nl-NL" dirty="0"/>
           </a:p>
@@ -4258,67 +5077,24 @@
       </p:sp>
       <p:cxnSp>
         <p:nvCxnSpPr>
-          <p:cNvPr id="20" name="Rechte verbindingslijn met pijl 19">
-            <a:extLst>
-              <a:ext uri="{FF2B5EF4-FFF2-40B4-BE49-F238E27FC236}">
-                <a16:creationId xmlns:a16="http://schemas.microsoft.com/office/drawing/2014/main" id="{DA8D83B7-C676-3A51-43A8-1871573A5C6B}"/>
+          <p:cNvPr id="10" name="Rechte verbindingslijn met pijl 9">
+            <a:extLst>
+              <a:ext uri="{FF2B5EF4-FFF2-40B4-BE49-F238E27FC236}">
+                <a16:creationId xmlns:a16="http://schemas.microsoft.com/office/drawing/2014/main" id="{3C223D93-6AFA-B294-96B2-B125E193339D}"/>
               </a:ext>
             </a:extLst>
           </p:cNvPr>
           <p:cNvCxnSpPr>
             <a:cxnSpLocks/>
-            <a:stCxn id="18" idx="3"/>
-            <a:endCxn id="3" idx="2"/>
+            <a:stCxn id="8" idx="3"/>
+            <a:endCxn id="3" idx="1"/>
           </p:cNvCxnSpPr>
           <p:nvPr/>
         </p:nvCxnSpPr>
         <p:spPr>
-          <a:xfrm flipV="1">
-            <a:off x="6092826" y="4279900"/>
-            <a:ext cx="6349" cy="705228"/>
-          </a:xfrm>
-          <a:prstGeom prst="straightConnector1">
-            <a:avLst/>
-          </a:prstGeom>
-          <a:ln w="38100">
-            <a:tailEnd type="triangle"/>
-          </a:ln>
-        </p:spPr>
-        <p:style>
-          <a:lnRef idx="1">
-            <a:schemeClr val="accent1"/>
-          </a:lnRef>
-          <a:fillRef idx="0">
-            <a:schemeClr val="accent1"/>
-          </a:fillRef>
-          <a:effectRef idx="0">
-            <a:schemeClr val="accent1"/>
-          </a:effectRef>
-          <a:fontRef idx="minor">
-            <a:schemeClr val="tx1"/>
-          </a:fontRef>
-        </p:style>
-      </p:cxnSp>
-      <p:cxnSp>
-        <p:nvCxnSpPr>
-          <p:cNvPr id="21" name="Rechte verbindingslijn met pijl 20">
-            <a:extLst>
-              <a:ext uri="{FF2B5EF4-FFF2-40B4-BE49-F238E27FC236}">
-                <a16:creationId xmlns:a16="http://schemas.microsoft.com/office/drawing/2014/main" id="{43BCA1FF-821F-8FFA-9B71-96B8597B0974}"/>
-              </a:ext>
-            </a:extLst>
-          </p:cNvPr>
-          <p:cNvCxnSpPr>
-            <a:cxnSpLocks/>
-            <a:stCxn id="6" idx="3"/>
-            <a:endCxn id="14" idx="2"/>
-          </p:cNvCxnSpPr>
-          <p:nvPr/>
-        </p:nvCxnSpPr>
-        <p:spPr>
-          <a:xfrm flipH="1" flipV="1">
-            <a:off x="6096000" y="2330450"/>
-            <a:ext cx="3175" cy="857439"/>
+          <a:xfrm>
+            <a:off x="3448049" y="3857108"/>
+            <a:ext cx="638176" cy="8927"/>
           </a:xfrm>
           <a:prstGeom prst="straightConnector1">
             <a:avLst/>

</xml_diff>